<commit_message>
concept:formulized & realization:start of win needs to be correction
</commit_message>
<xml_diff>
--- a/images/functonality.pptx
+++ b/images/functonality.pptx
@@ -10,7 +10,7 @@
     <p:sldId id="259" r:id="rId5"/>
     <p:sldId id="257" r:id="rId6"/>
   </p:sldIdLst>
-  <p:sldSz cx="7937500" cy="4632960"/>
+  <p:sldSz cx="10817860" cy="4632960"/>
   <p:notesSz cx="9144000" cy="6858000"/>
   <p:defaultTextStyle>
     <a:defPPr>
@@ -139,8 +139,8 @@
         </p:nvSpPr>
         <p:spPr>
           <a:xfrm>
-            <a:off x="992250" y="758488"/>
-            <a:ext cx="5953500" cy="1613531"/>
+            <a:off x="1352335" y="758527"/>
+            <a:ext cx="8114011" cy="1613615"/>
           </a:xfrm>
         </p:spPr>
         <p:txBody>
@@ -171,8 +171,8 @@
         </p:nvSpPr>
         <p:spPr>
           <a:xfrm>
-            <a:off x="992250" y="2434244"/>
-            <a:ext cx="5953500" cy="1118958"/>
+            <a:off x="1352335" y="2434370"/>
+            <a:ext cx="8114011" cy="1119016"/>
           </a:xfrm>
         </p:spPr>
         <p:txBody>
@@ -491,8 +491,8 @@
         </p:nvSpPr>
         <p:spPr>
           <a:xfrm>
-            <a:off x="5680631" y="246750"/>
-            <a:ext cx="1711631" cy="3927618"/>
+            <a:off x="7742119" y="246763"/>
+            <a:ext cx="2332778" cy="3927821"/>
           </a:xfrm>
         </p:spPr>
         <p:txBody>
@@ -519,8 +519,8 @@
         </p:nvSpPr>
         <p:spPr>
           <a:xfrm>
-            <a:off x="545738" y="246750"/>
-            <a:ext cx="5035669" cy="3927618"/>
+            <a:off x="743785" y="246763"/>
+            <a:ext cx="6863101" cy="3927821"/>
           </a:xfrm>
         </p:spPr>
         <p:txBody>
@@ -835,8 +835,8 @@
         </p:nvSpPr>
         <p:spPr>
           <a:xfrm>
-            <a:off x="541604" y="1155435"/>
-            <a:ext cx="6846525" cy="1927869"/>
+            <a:off x="738151" y="1155495"/>
+            <a:ext cx="9331113" cy="1927969"/>
           </a:xfrm>
         </p:spPr>
         <p:txBody>
@@ -867,8 +867,8 @@
         </p:nvSpPr>
         <p:spPr>
           <a:xfrm>
-            <a:off x="541604" y="3101541"/>
-            <a:ext cx="6846525" cy="1013821"/>
+            <a:off x="738151" y="3101702"/>
+            <a:ext cx="9331113" cy="1013874"/>
           </a:xfrm>
         </p:spPr>
         <p:txBody>
@@ -1098,8 +1098,8 @@
         </p:nvSpPr>
         <p:spPr>
           <a:xfrm>
-            <a:off x="545738" y="1233751"/>
-            <a:ext cx="3373650" cy="2940618"/>
+            <a:off x="743785" y="1233815"/>
+            <a:ext cx="4597940" cy="2940770"/>
           </a:xfrm>
         </p:spPr>
         <p:txBody>
@@ -1159,8 +1159,8 @@
         </p:nvSpPr>
         <p:spPr>
           <a:xfrm>
-            <a:off x="4018613" y="1233751"/>
-            <a:ext cx="3373650" cy="2940618"/>
+            <a:off x="5476958" y="1233815"/>
+            <a:ext cx="4597940" cy="2940770"/>
           </a:xfrm>
         </p:spPr>
         <p:txBody>
@@ -1308,8 +1308,8 @@
         </p:nvSpPr>
         <p:spPr>
           <a:xfrm>
-            <a:off x="546772" y="246750"/>
-            <a:ext cx="6846525" cy="895811"/>
+            <a:off x="745194" y="246763"/>
+            <a:ext cx="9331113" cy="895857"/>
           </a:xfrm>
         </p:spPr>
         <p:txBody>
@@ -1336,8 +1336,8 @@
         </p:nvSpPr>
         <p:spPr>
           <a:xfrm>
-            <a:off x="546772" y="1136124"/>
-            <a:ext cx="3358145" cy="556797"/>
+            <a:off x="745194" y="1136183"/>
+            <a:ext cx="4576808" cy="556826"/>
           </a:xfrm>
         </p:spPr>
         <p:txBody>
@@ -1402,8 +1402,8 @@
         </p:nvSpPr>
         <p:spPr>
           <a:xfrm>
-            <a:off x="546772" y="1692920"/>
-            <a:ext cx="3358145" cy="2490030"/>
+            <a:off x="745194" y="1693008"/>
+            <a:ext cx="4576808" cy="2490159"/>
           </a:xfrm>
         </p:spPr>
         <p:txBody>
@@ -1463,8 +1463,8 @@
         </p:nvSpPr>
         <p:spPr>
           <a:xfrm>
-            <a:off x="4018613" y="1136124"/>
-            <a:ext cx="3374684" cy="556797"/>
+            <a:off x="5476958" y="1136183"/>
+            <a:ext cx="4599349" cy="556826"/>
           </a:xfrm>
         </p:spPr>
         <p:txBody>
@@ -1529,8 +1529,8 @@
         </p:nvSpPr>
         <p:spPr>
           <a:xfrm>
-            <a:off x="4018613" y="1692920"/>
-            <a:ext cx="3374684" cy="2490030"/>
+            <a:off x="5476958" y="1693008"/>
+            <a:ext cx="4599349" cy="2490159"/>
           </a:xfrm>
         </p:spPr>
         <p:txBody>
@@ -1877,8 +1877,8 @@
         </p:nvSpPr>
         <p:spPr>
           <a:xfrm>
-            <a:off x="546772" y="308974"/>
-            <a:ext cx="2560211" cy="1081409"/>
+            <a:off x="745194" y="308990"/>
+            <a:ext cx="3489306" cy="1081465"/>
           </a:xfrm>
         </p:spPr>
         <p:txBody>
@@ -1909,8 +1909,8 @@
         </p:nvSpPr>
         <p:spPr>
           <a:xfrm>
-            <a:off x="3374684" y="667298"/>
-            <a:ext cx="4018613" cy="3293577"/>
+            <a:off x="4599349" y="667333"/>
+            <a:ext cx="5476958" cy="3293748"/>
           </a:xfrm>
         </p:spPr>
         <p:txBody>
@@ -1998,8 +1998,8 @@
         </p:nvSpPr>
         <p:spPr>
           <a:xfrm>
-            <a:off x="546772" y="1390383"/>
-            <a:ext cx="2560211" cy="2575857"/>
+            <a:off x="745194" y="1390455"/>
+            <a:ext cx="3489306" cy="2575990"/>
           </a:xfrm>
         </p:spPr>
         <p:txBody>
@@ -2152,8 +2152,8 @@
         </p:nvSpPr>
         <p:spPr>
           <a:xfrm>
-            <a:off x="546772" y="308974"/>
-            <a:ext cx="2560211" cy="1081409"/>
+            <a:off x="745194" y="308990"/>
+            <a:ext cx="3489306" cy="1081465"/>
           </a:xfrm>
         </p:spPr>
         <p:txBody>
@@ -2184,8 +2184,8 @@
         </p:nvSpPr>
         <p:spPr>
           <a:xfrm>
-            <a:off x="3374684" y="667298"/>
-            <a:ext cx="4018613" cy="3293577"/>
+            <a:off x="4599349" y="667333"/>
+            <a:ext cx="5476958" cy="3293748"/>
           </a:xfrm>
         </p:spPr>
         <p:txBody>
@@ -2245,8 +2245,8 @@
         </p:nvSpPr>
         <p:spPr>
           <a:xfrm>
-            <a:off x="546772" y="1390383"/>
-            <a:ext cx="2560211" cy="2575857"/>
+            <a:off x="745194" y="1390455"/>
+            <a:ext cx="3489306" cy="2575990"/>
           </a:xfrm>
         </p:spPr>
         <p:txBody>
@@ -2407,8 +2407,8 @@
         </p:nvSpPr>
         <p:spPr>
           <a:xfrm>
-            <a:off x="545738" y="246750"/>
-            <a:ext cx="6846525" cy="895811"/>
+            <a:off x="743785" y="246763"/>
+            <a:ext cx="9331113" cy="895857"/>
           </a:xfrm>
           <a:prstGeom prst="rect">
             <a:avLst/>
@@ -2440,8 +2440,8 @@
         </p:nvSpPr>
         <p:spPr>
           <a:xfrm>
-            <a:off x="545738" y="1233751"/>
-            <a:ext cx="6846525" cy="2940618"/>
+            <a:off x="743785" y="1233815"/>
+            <a:ext cx="9331113" cy="2940770"/>
           </a:xfrm>
           <a:prstGeom prst="rect">
             <a:avLst/>
@@ -2506,8 +2506,8 @@
         </p:nvSpPr>
         <p:spPr>
           <a:xfrm>
-            <a:off x="545738" y="4295598"/>
-            <a:ext cx="1786050" cy="246750"/>
+            <a:off x="743785" y="4295821"/>
+            <a:ext cx="2434203" cy="246763"/>
           </a:xfrm>
           <a:prstGeom prst="rect">
             <a:avLst/>
@@ -2546,8 +2546,8 @@
         </p:nvSpPr>
         <p:spPr>
           <a:xfrm>
-            <a:off x="2629463" y="4295598"/>
-            <a:ext cx="2679075" cy="246750"/>
+            <a:off x="3583689" y="4295821"/>
+            <a:ext cx="3651305" cy="246763"/>
           </a:xfrm>
           <a:prstGeom prst="rect">
             <a:avLst/>
@@ -2583,8 +2583,8 @@
         </p:nvSpPr>
         <p:spPr>
           <a:xfrm>
-            <a:off x="5606213" y="4295598"/>
-            <a:ext cx="1786050" cy="246750"/>
+            <a:off x="7640695" y="4295821"/>
+            <a:ext cx="2434203" cy="246763"/>
           </a:xfrm>
           <a:prstGeom prst="rect">
             <a:avLst/>
@@ -2648,7 +2648,7 @@
       </a:lvl1pPr>
     </p:titleStyle>
     <p:bodyStyle>
-      <a:lvl1pPr marL="153670" indent="-151130" algn="l" defTabSz="617220" rtl="0" eaLnBrk="1" latinLnBrk="0" hangingPunct="1">
+      <a:lvl1pPr marL="153670" indent="-150495" algn="l" defTabSz="617220" rtl="0" eaLnBrk="1" latinLnBrk="0" hangingPunct="1">
         <a:lnSpc>
           <a:spcPct val="90000"/>
         </a:lnSpc>
@@ -2666,7 +2666,7 @@
           <a:cs typeface="+mn-cs"/>
         </a:defRPr>
       </a:lvl1pPr>
-      <a:lvl2pPr marL="463550" indent="-151130" algn="l" defTabSz="617220" rtl="0" eaLnBrk="1" latinLnBrk="0" hangingPunct="1">
+      <a:lvl2pPr marL="463550" indent="-150495" algn="l" defTabSz="617220" rtl="0" eaLnBrk="1" latinLnBrk="0" hangingPunct="1">
         <a:lnSpc>
           <a:spcPct val="90000"/>
         </a:lnSpc>
@@ -2684,7 +2684,7 @@
           <a:cs typeface="+mn-cs"/>
         </a:defRPr>
       </a:lvl2pPr>
-      <a:lvl3pPr marL="772160" indent="-151130" algn="l" defTabSz="617220" rtl="0" eaLnBrk="1" latinLnBrk="0" hangingPunct="1">
+      <a:lvl3pPr marL="772160" indent="-150495" algn="l" defTabSz="617220" rtl="0" eaLnBrk="1" latinLnBrk="0" hangingPunct="1">
         <a:lnSpc>
           <a:spcPct val="90000"/>
         </a:lnSpc>
@@ -2702,7 +2702,7 @@
           <a:cs typeface="+mn-cs"/>
         </a:defRPr>
       </a:lvl3pPr>
-      <a:lvl4pPr marL="1080770" indent="-151130" algn="l" defTabSz="617220" rtl="0" eaLnBrk="1" latinLnBrk="0" hangingPunct="1">
+      <a:lvl4pPr marL="1080770" indent="-150495" algn="l" defTabSz="617220" rtl="0" eaLnBrk="1" latinLnBrk="0" hangingPunct="1">
         <a:lnSpc>
           <a:spcPct val="90000"/>
         </a:lnSpc>
@@ -2720,7 +2720,7 @@
           <a:cs typeface="+mn-cs"/>
         </a:defRPr>
       </a:lvl4pPr>
-      <a:lvl5pPr marL="1390650" indent="-151130" algn="l" defTabSz="617220" rtl="0" eaLnBrk="1" latinLnBrk="0" hangingPunct="1">
+      <a:lvl5pPr marL="1390650" indent="-150495" algn="l" defTabSz="617220" rtl="0" eaLnBrk="1" latinLnBrk="0" hangingPunct="1">
         <a:lnSpc>
           <a:spcPct val="90000"/>
         </a:lnSpc>
@@ -2738,7 +2738,7 @@
           <a:cs typeface="+mn-cs"/>
         </a:defRPr>
       </a:lvl5pPr>
-      <a:lvl6pPr marL="1699260" indent="-151130" algn="l" defTabSz="617220" rtl="0" eaLnBrk="1" latinLnBrk="0" hangingPunct="1">
+      <a:lvl6pPr marL="1699260" indent="-150495" algn="l" defTabSz="617220" rtl="0" eaLnBrk="1" latinLnBrk="0" hangingPunct="1">
         <a:lnSpc>
           <a:spcPct val="90000"/>
         </a:lnSpc>
@@ -2756,7 +2756,7 @@
           <a:cs typeface="+mn-cs"/>
         </a:defRPr>
       </a:lvl6pPr>
-      <a:lvl7pPr marL="2007870" indent="-151130" algn="l" defTabSz="617220" rtl="0" eaLnBrk="1" latinLnBrk="0" hangingPunct="1">
+      <a:lvl7pPr marL="2007870" indent="-150495" algn="l" defTabSz="617220" rtl="0" eaLnBrk="1" latinLnBrk="0" hangingPunct="1">
         <a:lnSpc>
           <a:spcPct val="90000"/>
         </a:lnSpc>
@@ -2774,7 +2774,7 @@
           <a:cs typeface="+mn-cs"/>
         </a:defRPr>
       </a:lvl7pPr>
-      <a:lvl8pPr marL="2317115" indent="-151130" algn="l" defTabSz="617220" rtl="0" eaLnBrk="1" latinLnBrk="0" hangingPunct="1">
+      <a:lvl8pPr marL="2317115" indent="-150495" algn="l" defTabSz="617220" rtl="0" eaLnBrk="1" latinLnBrk="0" hangingPunct="1">
         <a:lnSpc>
           <a:spcPct val="90000"/>
         </a:lnSpc>
@@ -2792,7 +2792,7 @@
           <a:cs typeface="+mn-cs"/>
         </a:defRPr>
       </a:lvl8pPr>
-      <a:lvl9pPr marL="2625725" indent="-151130" algn="l" defTabSz="617220" rtl="0" eaLnBrk="1" latinLnBrk="0" hangingPunct="1">
+      <a:lvl9pPr marL="2625725" indent="-150495" algn="l" defTabSz="617220" rtl="0" eaLnBrk="1" latinLnBrk="0" hangingPunct="1">
         <a:lnSpc>
           <a:spcPct val="90000"/>
         </a:lnSpc>
@@ -2935,8 +2935,8 @@
         </p:nvSpPr>
         <p:spPr>
           <a:xfrm>
-            <a:off x="1244583" y="1770644"/>
-            <a:ext cx="5348834" cy="1257832"/>
+            <a:off x="2684692" y="1770736"/>
+            <a:ext cx="5349111" cy="1257897"/>
           </a:xfrm>
           <a:prstGeom prst="rect">
             <a:avLst/>
@@ -2997,8 +2997,8 @@
         </p:nvSpPr>
         <p:spPr>
           <a:xfrm>
-            <a:off x="1244583" y="1770644"/>
-            <a:ext cx="1121460" cy="1257832"/>
+            <a:off x="2684692" y="1770736"/>
+            <a:ext cx="1121518" cy="1257897"/>
           </a:xfrm>
           <a:prstGeom prst="rect">
             <a:avLst/>
@@ -3053,8 +3053,8 @@
         </p:nvSpPr>
         <p:spPr>
           <a:xfrm>
-            <a:off x="2366044" y="1752248"/>
-            <a:ext cx="930148" cy="1259868"/>
+            <a:off x="3806211" y="1777105"/>
+            <a:ext cx="930196" cy="1259933"/>
           </a:xfrm>
           <a:prstGeom prst="rect">
             <a:avLst/>
@@ -3108,8 +3108,8 @@
         </p:nvSpPr>
         <p:spPr>
           <a:xfrm>
-            <a:off x="2366043" y="708266"/>
-            <a:ext cx="930149" cy="499402"/>
+            <a:off x="3806210" y="708303"/>
+            <a:ext cx="930197" cy="499428"/>
           </a:xfrm>
           <a:prstGeom prst="rect">
             <a:avLst/>
@@ -3163,8 +3163,8 @@
         </p:nvCxnSpPr>
         <p:spPr>
           <a:xfrm flipV="1">
-            <a:off x="2587898" y="3028475"/>
-            <a:ext cx="0" cy="443765"/>
+            <a:off x="4028077" y="3028632"/>
+            <a:ext cx="0" cy="443788"/>
           </a:xfrm>
           <a:prstGeom prst="straightConnector1">
             <a:avLst/>
@@ -3199,15 +3199,15 @@
         </p:nvCxnSpPr>
         <p:spPr>
           <a:xfrm flipV="1">
-            <a:off x="2748765" y="3042107"/>
-            <a:ext cx="0" cy="443765"/>
+            <a:off x="4230229" y="3025754"/>
+            <a:ext cx="0" cy="443788"/>
           </a:xfrm>
           <a:prstGeom prst="straightConnector1">
             <a:avLst/>
           </a:prstGeom>
           <a:ln w="60325" cmpd="sng">
             <a:solidFill>
-              <a:srgbClr val="FF0000"/>
+              <a:srgbClr val="00B050"/>
             </a:solidFill>
             <a:tailEnd type="triangle"/>
           </a:ln>
@@ -3235,8 +3235,8 @@
         </p:nvSpPr>
         <p:spPr>
           <a:xfrm>
-            <a:off x="1512785" y="3499504"/>
-            <a:ext cx="3157365" cy="441325"/>
+            <a:off x="2952908" y="3499685"/>
+            <a:ext cx="3157529" cy="441325"/>
           </a:xfrm>
           <a:prstGeom prst="rect">
             <a:avLst/>
@@ -3293,8 +3293,8 @@
         </p:nvCxnSpPr>
         <p:spPr>
           <a:xfrm>
-            <a:off x="2831117" y="1234931"/>
-            <a:ext cx="0" cy="533677"/>
+            <a:off x="4271308" y="1234995"/>
+            <a:ext cx="0" cy="533705"/>
           </a:xfrm>
           <a:prstGeom prst="straightConnector1">
             <a:avLst/>
@@ -3329,8 +3329,8 @@
         </p:nvSpPr>
         <p:spPr>
           <a:xfrm>
-            <a:off x="2831115" y="1270277"/>
-            <a:ext cx="2671561" cy="441325"/>
+            <a:off x="4271306" y="1270343"/>
+            <a:ext cx="2671699" cy="441325"/>
           </a:xfrm>
           <a:prstGeom prst="rect">
             <a:avLst/>
@@ -3416,6 +3416,129 @@
           </a:p>
         </p:txBody>
       </p:sp>
+      <p:grpSp>
+        <p:nvGrpSpPr>
+          <p:cNvPr id="6" name="组合 5"/>
+          <p:cNvGrpSpPr/>
+          <p:nvPr/>
+        </p:nvGrpSpPr>
+        <p:grpSpPr>
+          <a:xfrm>
+            <a:off x="8079866" y="3298356"/>
+            <a:ext cx="3265339" cy="642653"/>
+            <a:chOff x="8252" y="5631"/>
+            <a:chExt cx="5142" cy="1012"/>
+          </a:xfrm>
+        </p:grpSpPr>
+        <p:cxnSp>
+          <p:nvCxnSpPr>
+            <p:cNvPr id="2" name="Gerade Verbindung mit Pfeil 11"/>
+            <p:cNvCxnSpPr/>
+            <p:nvPr/>
+          </p:nvCxnSpPr>
+          <p:spPr>
+            <a:xfrm>
+              <a:off x="8252" y="6336"/>
+              <a:ext cx="672" cy="3"/>
+            </a:xfrm>
+            <a:prstGeom prst="straightConnector1">
+              <a:avLst/>
+            </a:prstGeom>
+            <a:ln w="60325" cmpd="sng">
+              <a:solidFill>
+                <a:srgbClr val="00B050"/>
+              </a:solidFill>
+              <a:tailEnd type="triangle"/>
+            </a:ln>
+          </p:spPr>
+          <p:style>
+            <a:lnRef idx="1">
+              <a:schemeClr val="accent1"/>
+            </a:lnRef>
+            <a:fillRef idx="0">
+              <a:schemeClr val="accent1"/>
+            </a:fillRef>
+            <a:effectRef idx="0">
+              <a:schemeClr val="accent1"/>
+            </a:effectRef>
+            <a:fontRef idx="minor">
+              <a:schemeClr val="tx1"/>
+            </a:fontRef>
+          </p:style>
+        </p:cxnSp>
+        <p:cxnSp>
+          <p:nvCxnSpPr>
+            <p:cNvPr id="3" name="Gerade Verbindung mit Pfeil 11"/>
+            <p:cNvCxnSpPr/>
+            <p:nvPr/>
+          </p:nvCxnSpPr>
+          <p:spPr>
+            <a:xfrm>
+              <a:off x="8252" y="5948"/>
+              <a:ext cx="672" cy="3"/>
+            </a:xfrm>
+            <a:prstGeom prst="straightConnector1">
+              <a:avLst/>
+            </a:prstGeom>
+            <a:ln w="60325" cmpd="sng">
+              <a:solidFill>
+                <a:schemeClr val="tx1"/>
+              </a:solidFill>
+              <a:tailEnd type="triangle"/>
+            </a:ln>
+          </p:spPr>
+          <p:style>
+            <a:lnRef idx="1">
+              <a:schemeClr val="accent1"/>
+            </a:lnRef>
+            <a:fillRef idx="0">
+              <a:schemeClr val="accent1"/>
+            </a:fillRef>
+            <a:effectRef idx="0">
+              <a:schemeClr val="accent1"/>
+            </a:effectRef>
+            <a:fontRef idx="minor">
+              <a:schemeClr val="tx1"/>
+            </a:fontRef>
+          </p:style>
+        </p:cxnSp>
+        <p:sp>
+          <p:nvSpPr>
+            <p:cNvPr id="4" name="文本框 3"/>
+            <p:cNvSpPr txBox="1"/>
+            <p:nvPr/>
+          </p:nvSpPr>
+          <p:spPr>
+            <a:xfrm>
+              <a:off x="9033" y="5631"/>
+              <a:ext cx="4361" cy="1012"/>
+            </a:xfrm>
+            <a:prstGeom prst="rect">
+              <a:avLst/>
+            </a:prstGeom>
+            <a:noFill/>
+          </p:spPr>
+          <p:txBody>
+            <a:bodyPr wrap="square" rtlCol="0">
+              <a:spAutoFit/>
+            </a:bodyPr>
+            <a:p>
+              <a:r>
+                <a:rPr lang="en-US" altLang="zh-CN"/>
+                <a:t>LLRF internal interface</a:t>
+              </a:r>
+              <a:endParaRPr lang="en-US" altLang="zh-CN"/>
+            </a:p>
+            <a:p>
+              <a:r>
+                <a:rPr lang="en-US" altLang="zh-CN"/>
+                <a:t>BuTiS interface</a:t>
+              </a:r>
+              <a:endParaRPr lang="en-US" altLang="zh-CN"/>
+            </a:p>
+          </p:txBody>
+        </p:sp>
+      </p:grpSp>
     </p:spTree>
   </p:cSld>
   <p:clrMapOvr>
@@ -3449,8 +3572,8 @@
         </p:nvSpPr>
         <p:spPr>
           <a:xfrm>
-            <a:off x="1239694" y="1669120"/>
-            <a:ext cx="5348834" cy="1257832"/>
+            <a:off x="2679803" y="1669206"/>
+            <a:ext cx="5349111" cy="1257897"/>
           </a:xfrm>
           <a:prstGeom prst="rect">
             <a:avLst/>
@@ -3510,8 +3633,8 @@
         </p:nvSpPr>
         <p:spPr>
           <a:xfrm>
-            <a:off x="1239694" y="1669120"/>
-            <a:ext cx="1121460" cy="1257832"/>
+            <a:off x="2679803" y="1669206"/>
+            <a:ext cx="1121518" cy="1257897"/>
           </a:xfrm>
           <a:prstGeom prst="rect">
             <a:avLst/>
@@ -3553,8 +3676,8 @@
         </p:nvCxnSpPr>
         <p:spPr>
           <a:xfrm flipV="1">
-            <a:off x="2583008" y="2926952"/>
-            <a:ext cx="0" cy="443765"/>
+            <a:off x="4023186" y="2927104"/>
+            <a:ext cx="0" cy="443788"/>
           </a:xfrm>
           <a:prstGeom prst="straightConnector1">
             <a:avLst/>
@@ -3589,15 +3712,15 @@
         </p:nvCxnSpPr>
         <p:spPr>
           <a:xfrm flipV="1">
-            <a:off x="2743877" y="2940583"/>
-            <a:ext cx="0" cy="443765"/>
+            <a:off x="4217085" y="2915969"/>
+            <a:ext cx="0" cy="443788"/>
           </a:xfrm>
           <a:prstGeom prst="straightConnector1">
             <a:avLst/>
           </a:prstGeom>
           <a:ln w="60325" cmpd="sng">
             <a:solidFill>
-              <a:srgbClr val="FF0000"/>
+              <a:srgbClr val="00B050"/>
             </a:solidFill>
             <a:tailEnd type="triangle"/>
           </a:ln>
@@ -3628,8 +3751,8 @@
         </p:nvCxnSpPr>
         <p:spPr>
           <a:xfrm flipV="1">
-            <a:off x="2834473" y="1192719"/>
-            <a:ext cx="0" cy="474312"/>
+            <a:off x="4274664" y="1192781"/>
+            <a:ext cx="0" cy="474337"/>
           </a:xfrm>
           <a:prstGeom prst="straightConnector1">
             <a:avLst/>
@@ -3664,8 +3787,8 @@
         </p:nvSpPr>
         <p:spPr>
           <a:xfrm>
-            <a:off x="2369398" y="731029"/>
-            <a:ext cx="930148" cy="461519"/>
+            <a:off x="3809565" y="731067"/>
+            <a:ext cx="930196" cy="461543"/>
           </a:xfrm>
           <a:prstGeom prst="rect">
             <a:avLst/>
@@ -3718,8 +3841,8 @@
         </p:nvSpPr>
         <p:spPr>
           <a:xfrm>
-            <a:off x="2369398" y="1667031"/>
-            <a:ext cx="930148" cy="1259868"/>
+            <a:off x="3809565" y="1667117"/>
+            <a:ext cx="930196" cy="1259933"/>
           </a:xfrm>
           <a:prstGeom prst="rect">
             <a:avLst/>
@@ -3772,8 +3895,8 @@
         </p:nvSpPr>
         <p:spPr>
           <a:xfrm>
-            <a:off x="1800425" y="3416311"/>
-            <a:ext cx="3157365" cy="441325"/>
+            <a:off x="3001155" y="3375211"/>
+            <a:ext cx="3157529" cy="441325"/>
           </a:xfrm>
           <a:prstGeom prst="rect">
             <a:avLst/>
@@ -3829,8 +3952,8 @@
         </p:nvSpPr>
         <p:spPr>
           <a:xfrm>
-            <a:off x="2834471" y="1240208"/>
-            <a:ext cx="3297226" cy="441325"/>
+            <a:off x="4274662" y="1240272"/>
+            <a:ext cx="3297397" cy="441325"/>
           </a:xfrm>
           <a:prstGeom prst="rect">
             <a:avLst/>
@@ -3878,6 +4001,129 @@
           </a:p>
         </p:txBody>
       </p:sp>
+      <p:grpSp>
+        <p:nvGrpSpPr>
+          <p:cNvPr id="6" name="组合 5"/>
+          <p:cNvGrpSpPr/>
+          <p:nvPr/>
+        </p:nvGrpSpPr>
+        <p:grpSpPr>
+          <a:xfrm>
+            <a:off x="8130031" y="3173896"/>
+            <a:ext cx="3265339" cy="642653"/>
+            <a:chOff x="8252" y="5631"/>
+            <a:chExt cx="5142" cy="1012"/>
+          </a:xfrm>
+        </p:grpSpPr>
+        <p:cxnSp>
+          <p:nvCxnSpPr>
+            <p:cNvPr id="2" name="Gerade Verbindung mit Pfeil 11"/>
+            <p:cNvCxnSpPr/>
+            <p:nvPr/>
+          </p:nvCxnSpPr>
+          <p:spPr>
+            <a:xfrm>
+              <a:off x="8252" y="6336"/>
+              <a:ext cx="672" cy="3"/>
+            </a:xfrm>
+            <a:prstGeom prst="straightConnector1">
+              <a:avLst/>
+            </a:prstGeom>
+            <a:ln w="60325" cmpd="sng">
+              <a:solidFill>
+                <a:srgbClr val="00B050"/>
+              </a:solidFill>
+              <a:tailEnd type="triangle"/>
+            </a:ln>
+          </p:spPr>
+          <p:style>
+            <a:lnRef idx="1">
+              <a:schemeClr val="accent1"/>
+            </a:lnRef>
+            <a:fillRef idx="0">
+              <a:schemeClr val="accent1"/>
+            </a:fillRef>
+            <a:effectRef idx="0">
+              <a:schemeClr val="accent1"/>
+            </a:effectRef>
+            <a:fontRef idx="minor">
+              <a:schemeClr val="tx1"/>
+            </a:fontRef>
+          </p:style>
+        </p:cxnSp>
+        <p:cxnSp>
+          <p:nvCxnSpPr>
+            <p:cNvPr id="3" name="Gerade Verbindung mit Pfeil 11"/>
+            <p:cNvCxnSpPr/>
+            <p:nvPr/>
+          </p:nvCxnSpPr>
+          <p:spPr>
+            <a:xfrm>
+              <a:off x="8252" y="5948"/>
+              <a:ext cx="672" cy="3"/>
+            </a:xfrm>
+            <a:prstGeom prst="straightConnector1">
+              <a:avLst/>
+            </a:prstGeom>
+            <a:ln w="60325" cmpd="sng">
+              <a:solidFill>
+                <a:schemeClr val="tx1"/>
+              </a:solidFill>
+              <a:tailEnd type="triangle"/>
+            </a:ln>
+          </p:spPr>
+          <p:style>
+            <a:lnRef idx="1">
+              <a:schemeClr val="accent1"/>
+            </a:lnRef>
+            <a:fillRef idx="0">
+              <a:schemeClr val="accent1"/>
+            </a:fillRef>
+            <a:effectRef idx="0">
+              <a:schemeClr val="accent1"/>
+            </a:effectRef>
+            <a:fontRef idx="minor">
+              <a:schemeClr val="tx1"/>
+            </a:fontRef>
+          </p:style>
+        </p:cxnSp>
+        <p:sp>
+          <p:nvSpPr>
+            <p:cNvPr id="5" name="文本框 4"/>
+            <p:cNvSpPr txBox="1"/>
+            <p:nvPr/>
+          </p:nvSpPr>
+          <p:spPr>
+            <a:xfrm>
+              <a:off x="9033" y="5631"/>
+              <a:ext cx="4361" cy="1012"/>
+            </a:xfrm>
+            <a:prstGeom prst="rect">
+              <a:avLst/>
+            </a:prstGeom>
+            <a:noFill/>
+          </p:spPr>
+          <p:txBody>
+            <a:bodyPr wrap="square" rtlCol="0">
+              <a:spAutoFit/>
+            </a:bodyPr>
+            <a:p>
+              <a:r>
+                <a:rPr lang="en-US" altLang="zh-CN"/>
+                <a:t>LLRF internal interface</a:t>
+              </a:r>
+              <a:endParaRPr lang="en-US" altLang="zh-CN"/>
+            </a:p>
+            <a:p>
+              <a:r>
+                <a:rPr lang="en-US" altLang="zh-CN"/>
+                <a:t>BuTiS interface</a:t>
+              </a:r>
+              <a:endParaRPr lang="en-US" altLang="zh-CN"/>
+            </a:p>
+          </p:txBody>
+        </p:sp>
+      </p:grpSp>
     </p:spTree>
   </p:cSld>
   <p:clrMapOvr>
@@ -3904,8 +4150,8 @@
         </p:nvSpPr>
         <p:spPr>
           <a:xfrm>
-            <a:off x="1101158" y="1879067"/>
-            <a:ext cx="5348834" cy="1257832"/>
+            <a:off x="2541260" y="1879164"/>
+            <a:ext cx="5349111" cy="1257897"/>
           </a:xfrm>
           <a:prstGeom prst="rect">
             <a:avLst/>
@@ -3965,8 +4211,8 @@
         </p:nvSpPr>
         <p:spPr>
           <a:xfrm>
-            <a:off x="1101158" y="1879067"/>
-            <a:ext cx="1121460" cy="1257832"/>
+            <a:off x="2541260" y="1879164"/>
+            <a:ext cx="1121518" cy="1257897"/>
           </a:xfrm>
           <a:prstGeom prst="rect">
             <a:avLst/>
@@ -4020,8 +4266,8 @@
         </p:nvSpPr>
         <p:spPr>
           <a:xfrm>
-            <a:off x="2222618" y="1877031"/>
-            <a:ext cx="930148" cy="1259868"/>
+            <a:off x="3662778" y="1877128"/>
+            <a:ext cx="930196" cy="1259933"/>
           </a:xfrm>
           <a:prstGeom prst="rect">
             <a:avLst/>
@@ -4076,8 +4322,8 @@
         </p:nvCxnSpPr>
         <p:spPr>
           <a:xfrm flipV="1">
-            <a:off x="2444472" y="3136899"/>
-            <a:ext cx="0" cy="443765"/>
+            <a:off x="3884643" y="3137061"/>
+            <a:ext cx="0" cy="443788"/>
           </a:xfrm>
           <a:prstGeom prst="straightConnector1">
             <a:avLst/>
@@ -4112,15 +4358,15 @@
         </p:nvCxnSpPr>
         <p:spPr>
           <a:xfrm flipV="1">
-            <a:off x="2605340" y="3150530"/>
-            <a:ext cx="0" cy="443765"/>
+            <a:off x="4103307" y="3125927"/>
+            <a:ext cx="0" cy="443788"/>
           </a:xfrm>
           <a:prstGeom prst="straightConnector1">
             <a:avLst/>
           </a:prstGeom>
           <a:ln w="60325" cmpd="sng">
             <a:solidFill>
-              <a:srgbClr val="FF0000"/>
+              <a:srgbClr val="00B050"/>
             </a:solidFill>
             <a:tailEnd type="triangle"/>
           </a:ln>
@@ -4148,8 +4394,8 @@
         </p:nvSpPr>
         <p:spPr>
           <a:xfrm>
-            <a:off x="3152766" y="1875213"/>
-            <a:ext cx="930148" cy="1259868"/>
+            <a:off x="4592974" y="1875310"/>
+            <a:ext cx="930196" cy="1259933"/>
           </a:xfrm>
           <a:prstGeom prst="rect">
             <a:avLst/>
@@ -4202,8 +4448,8 @@
         </p:nvCxnSpPr>
         <p:spPr>
           <a:xfrm flipV="1">
-            <a:off x="3608761" y="3164162"/>
-            <a:ext cx="0" cy="443765"/>
+            <a:off x="5048992" y="3164326"/>
+            <a:ext cx="0" cy="443788"/>
           </a:xfrm>
           <a:prstGeom prst="straightConnector1">
             <a:avLst/>
@@ -4238,15 +4484,15 @@
         </p:nvCxnSpPr>
         <p:spPr>
           <a:xfrm flipV="1">
-            <a:off x="3769628" y="3177793"/>
-            <a:ext cx="0" cy="443765"/>
+            <a:off x="5284167" y="3153191"/>
+            <a:ext cx="0" cy="443788"/>
           </a:xfrm>
           <a:prstGeom prst="straightConnector1">
             <a:avLst/>
           </a:prstGeom>
           <a:ln w="60325" cmpd="sng">
             <a:solidFill>
-              <a:srgbClr val="FF0000"/>
+              <a:srgbClr val="00B050"/>
             </a:solidFill>
             <a:tailEnd type="triangle"/>
           </a:ln>
@@ -4276,8 +4522,8 @@
         </p:nvCxnSpPr>
         <p:spPr>
           <a:xfrm flipH="1" flipV="1">
-            <a:off x="3606808" y="1412702"/>
-            <a:ext cx="2198" cy="462770"/>
+            <a:off x="5047039" y="1412775"/>
+            <a:ext cx="2198" cy="462794"/>
           </a:xfrm>
           <a:prstGeom prst="straightConnector1">
             <a:avLst/>
@@ -4312,8 +4558,8 @@
         </p:nvSpPr>
         <p:spPr>
           <a:xfrm>
-            <a:off x="3033532" y="700348"/>
-            <a:ext cx="1146630" cy="712365"/>
+            <a:off x="4473734" y="700384"/>
+            <a:ext cx="1146689" cy="712402"/>
           </a:xfrm>
           <a:prstGeom prst="rect">
             <a:avLst/>
@@ -4366,8 +4612,8 @@
         </p:nvSpPr>
         <p:spPr>
           <a:xfrm>
-            <a:off x="1661888" y="3580663"/>
-            <a:ext cx="3157365" cy="441325"/>
+            <a:off x="2870867" y="3556082"/>
+            <a:ext cx="3157529" cy="441325"/>
           </a:xfrm>
           <a:prstGeom prst="rect">
             <a:avLst/>
@@ -4423,8 +4669,8 @@
         </p:nvSpPr>
         <p:spPr>
           <a:xfrm>
-            <a:off x="3678807" y="1412494"/>
-            <a:ext cx="4100629" cy="441325"/>
+            <a:off x="5119042" y="1412567"/>
+            <a:ext cx="4100841" cy="441325"/>
           </a:xfrm>
           <a:prstGeom prst="rect">
             <a:avLst/>
@@ -4460,6 +4706,129 @@
           </a:p>
         </p:txBody>
       </p:sp>
+      <p:grpSp>
+        <p:nvGrpSpPr>
+          <p:cNvPr id="6" name="组合 5"/>
+          <p:cNvGrpSpPr/>
+          <p:nvPr/>
+        </p:nvGrpSpPr>
+        <p:grpSpPr>
+          <a:xfrm>
+            <a:off x="8173085" y="3354705"/>
+            <a:ext cx="2690634" cy="642653"/>
+            <a:chOff x="8252" y="5631"/>
+            <a:chExt cx="5142" cy="1012"/>
+          </a:xfrm>
+        </p:grpSpPr>
+        <p:cxnSp>
+          <p:nvCxnSpPr>
+            <p:cNvPr id="2" name="Gerade Verbindung mit Pfeil 11"/>
+            <p:cNvCxnSpPr/>
+            <p:nvPr/>
+          </p:nvCxnSpPr>
+          <p:spPr>
+            <a:xfrm>
+              <a:off x="8252" y="6336"/>
+              <a:ext cx="672" cy="3"/>
+            </a:xfrm>
+            <a:prstGeom prst="straightConnector1">
+              <a:avLst/>
+            </a:prstGeom>
+            <a:ln w="60325" cmpd="sng">
+              <a:solidFill>
+                <a:srgbClr val="00B050"/>
+              </a:solidFill>
+              <a:tailEnd type="triangle"/>
+            </a:ln>
+          </p:spPr>
+          <p:style>
+            <a:lnRef idx="1">
+              <a:schemeClr val="accent1"/>
+            </a:lnRef>
+            <a:fillRef idx="0">
+              <a:schemeClr val="accent1"/>
+            </a:fillRef>
+            <a:effectRef idx="0">
+              <a:schemeClr val="accent1"/>
+            </a:effectRef>
+            <a:fontRef idx="minor">
+              <a:schemeClr val="tx1"/>
+            </a:fontRef>
+          </p:style>
+        </p:cxnSp>
+        <p:cxnSp>
+          <p:nvCxnSpPr>
+            <p:cNvPr id="3" name="Gerade Verbindung mit Pfeil 11"/>
+            <p:cNvCxnSpPr/>
+            <p:nvPr/>
+          </p:nvCxnSpPr>
+          <p:spPr>
+            <a:xfrm>
+              <a:off x="8252" y="5948"/>
+              <a:ext cx="672" cy="3"/>
+            </a:xfrm>
+            <a:prstGeom prst="straightConnector1">
+              <a:avLst/>
+            </a:prstGeom>
+            <a:ln w="60325" cmpd="sng">
+              <a:solidFill>
+                <a:schemeClr val="tx1"/>
+              </a:solidFill>
+              <a:tailEnd type="triangle"/>
+            </a:ln>
+          </p:spPr>
+          <p:style>
+            <a:lnRef idx="1">
+              <a:schemeClr val="accent1"/>
+            </a:lnRef>
+            <a:fillRef idx="0">
+              <a:schemeClr val="accent1"/>
+            </a:fillRef>
+            <a:effectRef idx="0">
+              <a:schemeClr val="accent1"/>
+            </a:effectRef>
+            <a:fontRef idx="minor">
+              <a:schemeClr val="tx1"/>
+            </a:fontRef>
+          </p:style>
+        </p:cxnSp>
+        <p:sp>
+          <p:nvSpPr>
+            <p:cNvPr id="4" name="文本框 3"/>
+            <p:cNvSpPr txBox="1"/>
+            <p:nvPr/>
+          </p:nvSpPr>
+          <p:spPr>
+            <a:xfrm>
+              <a:off x="9033" y="5631"/>
+              <a:ext cx="4361" cy="1012"/>
+            </a:xfrm>
+            <a:prstGeom prst="rect">
+              <a:avLst/>
+            </a:prstGeom>
+            <a:noFill/>
+          </p:spPr>
+          <p:txBody>
+            <a:bodyPr wrap="square" rtlCol="0">
+              <a:spAutoFit/>
+            </a:bodyPr>
+            <a:p>
+              <a:r>
+                <a:rPr lang="en-US" altLang="zh-CN"/>
+                <a:t>LLRF internal interface</a:t>
+              </a:r>
+              <a:endParaRPr lang="en-US" altLang="zh-CN"/>
+            </a:p>
+            <a:p>
+              <a:r>
+                <a:rPr lang="en-US" altLang="zh-CN"/>
+                <a:t>BuTiS interface</a:t>
+              </a:r>
+              <a:endParaRPr lang="en-US" altLang="zh-CN"/>
+            </a:p>
+          </p:txBody>
+        </p:sp>
+      </p:grpSp>
     </p:spTree>
   </p:cSld>
   <p:clrMapOvr>
@@ -4493,8 +4862,8 @@
         </p:nvSpPr>
         <p:spPr>
           <a:xfrm>
-            <a:off x="1054077" y="2517768"/>
-            <a:ext cx="5358093" cy="1292049"/>
+            <a:off x="2469410" y="2401687"/>
+            <a:ext cx="5358371" cy="1292116"/>
           </a:xfrm>
           <a:prstGeom prst="rect">
             <a:avLst/>
@@ -4555,8 +4924,8 @@
         </p:nvSpPr>
         <p:spPr>
           <a:xfrm>
-            <a:off x="1054076" y="2517768"/>
-            <a:ext cx="1123402" cy="1292049"/>
+            <a:off x="2469409" y="2401687"/>
+            <a:ext cx="1123460" cy="1292116"/>
           </a:xfrm>
           <a:prstGeom prst="rect">
             <a:avLst/>
@@ -4599,8 +4968,8 @@
         </p:nvSpPr>
         <p:spPr>
           <a:xfrm>
-            <a:off x="2175538" y="2504137"/>
-            <a:ext cx="931758" cy="1294141"/>
+            <a:off x="3590929" y="2388056"/>
+            <a:ext cx="931806" cy="1294208"/>
           </a:xfrm>
           <a:prstGeom prst="rect">
             <a:avLst/>
@@ -4656,8 +5025,8 @@
         </p:nvSpPr>
         <p:spPr>
           <a:xfrm>
-            <a:off x="1647784" y="4250463"/>
-            <a:ext cx="3162831" cy="441325"/>
+            <a:off x="3013615" y="4134472"/>
+            <a:ext cx="3162995" cy="441325"/>
           </a:xfrm>
           <a:prstGeom prst="rect">
             <a:avLst/>
@@ -4714,8 +5083,8 @@
         </p:nvSpPr>
         <p:spPr>
           <a:xfrm>
-            <a:off x="3115100" y="2504137"/>
-            <a:ext cx="931758" cy="1294141"/>
+            <a:off x="4530540" y="2388056"/>
+            <a:ext cx="931806" cy="1294208"/>
           </a:xfrm>
           <a:prstGeom prst="rect">
             <a:avLst/>
@@ -4769,8 +5138,8 @@
         </p:nvSpPr>
         <p:spPr>
           <a:xfrm>
-            <a:off x="2734905" y="142256"/>
-            <a:ext cx="1691347" cy="1388482"/>
+            <a:off x="4150325" y="26052"/>
+            <a:ext cx="1691435" cy="1388554"/>
           </a:xfrm>
           <a:prstGeom prst="rect">
             <a:avLst/>
@@ -4851,22 +5220,20 @@
       <p:cxnSp>
         <p:nvCxnSpPr>
           <p:cNvPr id="16" name="Gerade Verbindung mit Pfeil 15"/>
-          <p:cNvCxnSpPr>
-            <a:endCxn id="15" idx="2"/>
-          </p:cNvCxnSpPr>
+          <p:cNvCxnSpPr/>
           <p:nvPr/>
         </p:nvCxnSpPr>
         <p:spPr>
           <a:xfrm flipV="1">
-            <a:off x="3573282" y="1530660"/>
-            <a:ext cx="7695" cy="341307"/>
+            <a:off x="4983665" y="1434849"/>
+            <a:ext cx="7695" cy="341325"/>
           </a:xfrm>
           <a:prstGeom prst="straightConnector1">
             <a:avLst/>
           </a:prstGeom>
           <a:ln w="44450">
             <a:solidFill>
-              <a:schemeClr val="tx1"/>
+              <a:schemeClr val="accent1"/>
             </a:solidFill>
             <a:prstDash val="sysDash"/>
             <a:tailEnd type="triangle"/>
@@ -4895,8 +5262,8 @@
         </p:nvSpPr>
         <p:spPr>
           <a:xfrm>
-            <a:off x="4067833" y="1252093"/>
-            <a:ext cx="1689541" cy="932680"/>
+            <a:off x="5483225" y="1136015"/>
+            <a:ext cx="1807845" cy="932815"/>
           </a:xfrm>
           <a:prstGeom prst="rect">
             <a:avLst/>
@@ -4958,8 +5325,8 @@
         </p:nvSpPr>
         <p:spPr>
           <a:xfrm>
-            <a:off x="2175538" y="1723068"/>
-            <a:ext cx="930148" cy="461519"/>
+            <a:off x="3590929" y="1606946"/>
+            <a:ext cx="930196" cy="461543"/>
           </a:xfrm>
           <a:prstGeom prst="rect">
             <a:avLst/>
@@ -5015,8 +5382,8 @@
         </p:nvCxnSpPr>
         <p:spPr>
           <a:xfrm flipV="1">
-            <a:off x="2631253" y="2184694"/>
-            <a:ext cx="9343" cy="330864"/>
+            <a:off x="4047303" y="2060341"/>
+            <a:ext cx="9343" cy="330881"/>
           </a:xfrm>
           <a:prstGeom prst="straightConnector1">
             <a:avLst/>
@@ -5051,8 +5418,8 @@
         </p:nvCxnSpPr>
         <p:spPr>
           <a:xfrm flipV="1">
-            <a:off x="2559952" y="3807253"/>
-            <a:ext cx="0" cy="443765"/>
+            <a:off x="3975363" y="3691239"/>
+            <a:ext cx="0" cy="443788"/>
           </a:xfrm>
           <a:prstGeom prst="straightConnector1">
             <a:avLst/>
@@ -5087,15 +5454,15 @@
         </p:nvCxnSpPr>
         <p:spPr>
           <a:xfrm flipV="1">
-            <a:off x="2720820" y="3820884"/>
-            <a:ext cx="0" cy="443765"/>
+            <a:off x="4257530" y="3690900"/>
+            <a:ext cx="0" cy="443788"/>
           </a:xfrm>
           <a:prstGeom prst="straightConnector1">
             <a:avLst/>
           </a:prstGeom>
           <a:ln w="60325" cmpd="sng">
             <a:solidFill>
-              <a:srgbClr val="FF0000"/>
+              <a:srgbClr val="00B050"/>
             </a:solidFill>
             <a:tailEnd type="triangle"/>
           </a:ln>
@@ -5123,15 +5490,15 @@
         </p:nvCxnSpPr>
         <p:spPr>
           <a:xfrm>
-            <a:off x="3573282" y="1849982"/>
-            <a:ext cx="494648" cy="550"/>
+            <a:off x="4988745" y="1733867"/>
+            <a:ext cx="494674" cy="550"/>
           </a:xfrm>
           <a:prstGeom prst="straightConnector1">
             <a:avLst/>
           </a:prstGeom>
           <a:ln w="44450">
             <a:solidFill>
-              <a:schemeClr val="tx1"/>
+              <a:schemeClr val="accent1"/>
             </a:solidFill>
             <a:prstDash val="sysDash"/>
             <a:tailEnd type="triangle"/>
@@ -5160,13 +5527,17 @@
         </p:nvCxnSpPr>
         <p:spPr>
           <a:xfrm flipH="1">
-            <a:off x="3569984" y="1904943"/>
-            <a:ext cx="3298" cy="599073"/>
+            <a:off x="4985447" y="1788831"/>
+            <a:ext cx="3298" cy="599104"/>
           </a:xfrm>
           <a:prstGeom prst="line">
             <a:avLst/>
           </a:prstGeom>
-          <a:ln w="38100"/>
+          <a:ln w="38100">
+            <a:solidFill>
+              <a:schemeClr val="accent1"/>
+            </a:solidFill>
+          </a:ln>
         </p:spPr>
         <p:style>
           <a:lnRef idx="3">
@@ -5191,8 +5562,8 @@
         </p:nvSpPr>
         <p:spPr>
           <a:xfrm>
-            <a:off x="3595266" y="1443272"/>
-            <a:ext cx="477610" cy="441325"/>
+            <a:off x="5005650" y="1330946"/>
+            <a:ext cx="477635" cy="441325"/>
           </a:xfrm>
           <a:prstGeom prst="rect">
             <a:avLst/>
@@ -5228,6 +5599,172 @@
           </a:p>
         </p:txBody>
       </p:sp>
+      <p:grpSp>
+        <p:nvGrpSpPr>
+          <p:cNvPr id="14" name="组合 13"/>
+          <p:cNvGrpSpPr/>
+          <p:nvPr/>
+        </p:nvGrpSpPr>
+        <p:grpSpPr>
+          <a:xfrm>
+            <a:off x="8011160" y="3745865"/>
+            <a:ext cx="3340100" cy="916940"/>
+            <a:chOff x="9317" y="5918"/>
+            <a:chExt cx="5260" cy="1444"/>
+          </a:xfrm>
+        </p:grpSpPr>
+        <p:cxnSp>
+          <p:nvCxnSpPr>
+            <p:cNvPr id="7" name="Gerade Verbindung mit Pfeil 11"/>
+            <p:cNvCxnSpPr/>
+            <p:nvPr/>
+          </p:nvCxnSpPr>
+          <p:spPr>
+            <a:xfrm>
+              <a:off x="9317" y="6638"/>
+              <a:ext cx="672" cy="3"/>
+            </a:xfrm>
+            <a:prstGeom prst="straightConnector1">
+              <a:avLst/>
+            </a:prstGeom>
+            <a:ln w="60325" cmpd="sng">
+              <a:solidFill>
+                <a:srgbClr val="00B050"/>
+              </a:solidFill>
+              <a:tailEnd type="triangle"/>
+            </a:ln>
+          </p:spPr>
+          <p:style>
+            <a:lnRef idx="1">
+              <a:schemeClr val="accent1"/>
+            </a:lnRef>
+            <a:fillRef idx="0">
+              <a:schemeClr val="accent1"/>
+            </a:fillRef>
+            <a:effectRef idx="0">
+              <a:schemeClr val="accent1"/>
+            </a:effectRef>
+            <a:fontRef idx="minor">
+              <a:schemeClr val="tx1"/>
+            </a:fontRef>
+          </p:style>
+        </p:cxnSp>
+        <p:cxnSp>
+          <p:nvCxnSpPr>
+            <p:cNvPr id="8" name="Gerade Verbindung mit Pfeil 11"/>
+            <p:cNvCxnSpPr/>
+            <p:nvPr/>
+          </p:nvCxnSpPr>
+          <p:spPr>
+            <a:xfrm>
+              <a:off x="9317" y="6237"/>
+              <a:ext cx="672" cy="3"/>
+            </a:xfrm>
+            <a:prstGeom prst="straightConnector1">
+              <a:avLst/>
+            </a:prstGeom>
+            <a:ln w="60325" cmpd="sng">
+              <a:solidFill>
+                <a:schemeClr val="tx1"/>
+              </a:solidFill>
+              <a:tailEnd type="triangle"/>
+            </a:ln>
+          </p:spPr>
+          <p:style>
+            <a:lnRef idx="1">
+              <a:schemeClr val="accent1"/>
+            </a:lnRef>
+            <a:fillRef idx="0">
+              <a:schemeClr val="accent1"/>
+            </a:fillRef>
+            <a:effectRef idx="0">
+              <a:schemeClr val="accent1"/>
+            </a:effectRef>
+            <a:fontRef idx="minor">
+              <a:schemeClr val="tx1"/>
+            </a:fontRef>
+          </p:style>
+        </p:cxnSp>
+        <p:sp>
+          <p:nvSpPr>
+            <p:cNvPr id="9" name="文本框 8"/>
+            <p:cNvSpPr txBox="1"/>
+            <p:nvPr/>
+          </p:nvSpPr>
+          <p:spPr>
+            <a:xfrm>
+              <a:off x="10217" y="5918"/>
+              <a:ext cx="4361" cy="1444"/>
+            </a:xfrm>
+            <a:prstGeom prst="rect">
+              <a:avLst/>
+            </a:prstGeom>
+            <a:noFill/>
+          </p:spPr>
+          <p:txBody>
+            <a:bodyPr wrap="square" rtlCol="0">
+              <a:spAutoFit/>
+            </a:bodyPr>
+            <a:p>
+              <a:r>
+                <a:rPr lang="en-US" altLang="zh-CN"/>
+                <a:t>LLRF internal interface</a:t>
+              </a:r>
+              <a:endParaRPr lang="en-US" altLang="zh-CN"/>
+            </a:p>
+            <a:p>
+              <a:r>
+                <a:rPr lang="en-US" altLang="zh-CN"/>
+                <a:t>BuTiS interface</a:t>
+              </a:r>
+              <a:endParaRPr lang="en-US" altLang="zh-CN"/>
+            </a:p>
+            <a:p>
+              <a:r>
+                <a:rPr lang="en-US" altLang="zh-CN"/>
+                <a:t>Digital signal</a:t>
+              </a:r>
+              <a:endParaRPr lang="en-US" altLang="zh-CN"/>
+            </a:p>
+          </p:txBody>
+        </p:sp>
+        <p:cxnSp>
+          <p:nvCxnSpPr>
+            <p:cNvPr id="12" name="Gerade Verbindung mit Pfeil 11"/>
+            <p:cNvCxnSpPr/>
+            <p:nvPr/>
+          </p:nvCxnSpPr>
+          <p:spPr>
+            <a:xfrm>
+              <a:off x="9335" y="7033"/>
+              <a:ext cx="672" cy="3"/>
+            </a:xfrm>
+            <a:prstGeom prst="straightConnector1">
+              <a:avLst/>
+            </a:prstGeom>
+            <a:ln w="60325" cmpd="sng">
+              <a:solidFill>
+                <a:schemeClr val="accent1"/>
+              </a:solidFill>
+              <a:tailEnd type="triangle"/>
+            </a:ln>
+          </p:spPr>
+          <p:style>
+            <a:lnRef idx="1">
+              <a:schemeClr val="accent1"/>
+            </a:lnRef>
+            <a:fillRef idx="0">
+              <a:schemeClr val="accent1"/>
+            </a:fillRef>
+            <a:effectRef idx="0">
+              <a:schemeClr val="accent1"/>
+            </a:effectRef>
+            <a:fontRef idx="minor">
+              <a:schemeClr val="tx1"/>
+            </a:fontRef>
+          </p:style>
+        </p:cxnSp>
+      </p:grpSp>
     </p:spTree>
   </p:cSld>
   <p:clrMapOvr>

</xml_diff>